<commit_message>
Update slides and TOC
</commit_message>
<xml_diff>
--- a/warner-DP-420-slides.pptx
+++ b/warner-DP-420-slides.pptx
@@ -5,7 +5,7 @@
     <p:sldMasterId id="2147483648" r:id="rId1"/>
   </p:sldMasterIdLst>
   <p:notesMasterIdLst>
-    <p:notesMasterId r:id="rId35"/>
+    <p:notesMasterId r:id="rId42"/>
   </p:notesMasterIdLst>
   <p:sldIdLst>
     <p:sldId id="257" r:id="rId2"/>
@@ -25,22 +25,29 @@
     <p:sldId id="2076137127" r:id="rId16"/>
     <p:sldId id="2134805717" r:id="rId17"/>
     <p:sldId id="2134805735" r:id="rId18"/>
-    <p:sldId id="2134805627" r:id="rId19"/>
-    <p:sldId id="2134805628" r:id="rId20"/>
-    <p:sldId id="2134805629" r:id="rId21"/>
-    <p:sldId id="2134805630" r:id="rId22"/>
-    <p:sldId id="2134805736" r:id="rId23"/>
-    <p:sldId id="2134805737" r:id="rId24"/>
-    <p:sldId id="2134805738" r:id="rId25"/>
-    <p:sldId id="2134805739" r:id="rId26"/>
-    <p:sldId id="2134805740" r:id="rId27"/>
-    <p:sldId id="2134805741" r:id="rId28"/>
-    <p:sldId id="2134805742" r:id="rId29"/>
-    <p:sldId id="2134805743" r:id="rId30"/>
-    <p:sldId id="2134805744" r:id="rId31"/>
-    <p:sldId id="2134805745" r:id="rId32"/>
-    <p:sldId id="2134805746" r:id="rId33"/>
-    <p:sldId id="2134805747" r:id="rId34"/>
+    <p:sldId id="2134805748" r:id="rId19"/>
+    <p:sldId id="2134805749" r:id="rId20"/>
+    <p:sldId id="2134805750" r:id="rId21"/>
+    <p:sldId id="2134805751" r:id="rId22"/>
+    <p:sldId id="2134805752" r:id="rId23"/>
+    <p:sldId id="2134805753" r:id="rId24"/>
+    <p:sldId id="2134805754" r:id="rId25"/>
+    <p:sldId id="2134805627" r:id="rId26"/>
+    <p:sldId id="2134805628" r:id="rId27"/>
+    <p:sldId id="2134805629" r:id="rId28"/>
+    <p:sldId id="2134805630" r:id="rId29"/>
+    <p:sldId id="2134805736" r:id="rId30"/>
+    <p:sldId id="2134805737" r:id="rId31"/>
+    <p:sldId id="2134805738" r:id="rId32"/>
+    <p:sldId id="2134805739" r:id="rId33"/>
+    <p:sldId id="2134805740" r:id="rId34"/>
+    <p:sldId id="2134805741" r:id="rId35"/>
+    <p:sldId id="2134805742" r:id="rId36"/>
+    <p:sldId id="2134805743" r:id="rId37"/>
+    <p:sldId id="2134805744" r:id="rId38"/>
+    <p:sldId id="2134805745" r:id="rId39"/>
+    <p:sldId id="2134805746" r:id="rId40"/>
+    <p:sldId id="2134805747" r:id="rId41"/>
   </p:sldIdLst>
   <p:sldSz cx="9144000" cy="5143500" type="screen16x9"/>
   <p:notesSz cx="6858000" cy="9144000"/>
@@ -161,10 +168,29 @@
             <p14:sldId id="2076137127"/>
           </p14:sldIdLst>
         </p14:section>
-        <p14:section name="CONTENT" id="{9A603BEC-B55F-47B6-8AC7-F7BEBBCECE4F}">
+        <p14:section name="DATA MODELING" id="{9A603BEC-B55F-47B6-8AC7-F7BEBBCECE4F}">
           <p14:sldIdLst>
             <p14:sldId id="2134805717"/>
             <p14:sldId id="2134805735"/>
+          </p14:sldIdLst>
+        </p14:section>
+        <p14:section name="DATA DISTRIBUTION" id="{494E7051-D431-435E-B165-9B3A1953AD4A}">
+          <p14:sldIdLst>
+            <p14:sldId id="2134805748"/>
+            <p14:sldId id="2134805749"/>
+          </p14:sldIdLst>
+        </p14:section>
+        <p14:section name="INTEGRATION" id="{93251453-FB4B-4DFA-B75F-EE188462FAE5}">
+          <p14:sldIdLst>
+            <p14:sldId id="2134805750"/>
+            <p14:sldId id="2134805751"/>
+            <p14:sldId id="2134805752"/>
+          </p14:sldIdLst>
+        </p14:section>
+        <p14:section name="MONITORING AND OPTIMIZATION" id="{D5745D53-7BE5-4247-BDAC-E9A2C9AAE78B}">
+          <p14:sldIdLst>
+            <p14:sldId id="2134805753"/>
+            <p14:sldId id="2134805754"/>
           </p14:sldIdLst>
         </p14:section>
         <p14:section name="PRACTICE QUESTIONS" id="{6AB5555C-AC17-3D42-8B0B-3C9D4CC370D2}">
@@ -1635,7 +1661,7 @@
           <a:p>
             <a:fld id="{AE2FBFE4-0F8A-4B15-A914-6F6D88F104DE}" type="datetimeFigureOut">
               <a:rPr lang="en-US" smtClean="0"/>
-              <a:t>Sat, 8/13/2022</a:t>
+              <a:t>Mon, 8/15/2022</a:t>
             </a:fld>
             <a:endParaRPr lang="en-US"/>
           </a:p>
@@ -4093,7 +4119,7 @@
           <a:p>
             <a:fld id="{128B0A6C-EF38-9441-ADBF-8FE45FA6C46E}" type="datetimeFigureOut">
               <a:rPr lang="en-US" smtClean="0"/>
-              <a:t>Sat, 8/13/2022</a:t>
+              <a:t>Mon, 8/15/2022</a:t>
             </a:fld>
             <a:endParaRPr lang="en-US"/>
           </a:p>
@@ -5583,7 +5609,7 @@
           <a:p>
             <a:r>
               <a:rPr lang="en-US" dirty="0"/>
-              <a:t>Title</a:t>
+              <a:t>Data Modeling</a:t>
             </a:r>
           </a:p>
         </p:txBody>
@@ -5703,7 +5729,7 @@
           <p:cNvPr id="4" name="Title 3">
             <a:extLst>
               <a:ext uri="{FF2B5EF4-FFF2-40B4-BE49-F238E27FC236}">
-                <a16:creationId xmlns:a16="http://schemas.microsoft.com/office/drawing/2014/main" id="{59384D36-FDB2-E34A-B67D-980B0EBB81E7}"/>
+                <a16:creationId xmlns:a16="http://schemas.microsoft.com/office/drawing/2014/main" id="{36B7B053-4419-46E9-90C1-BAB3FC7E108B}"/>
               </a:ext>
             </a:extLst>
           </p:cNvPr>
@@ -5711,7 +5737,7 @@
             <a:spLocks noGrp="1"/>
           </p:cNvSpPr>
           <p:nvPr>
-            <p:ph type="title"/>
+            <p:ph type="ctrTitle"/>
           </p:nvPr>
         </p:nvSpPr>
         <p:spPr/>
@@ -5719,14 +5745,17 @@
           <a:bodyPr/>
           <a:lstStyle/>
           <a:p>
-            <a:endParaRPr lang="en-US"/>
+            <a:r>
+              <a:rPr lang="en-US" dirty="0"/>
+              <a:t>Data Distribution</a:t>
+            </a:r>
           </a:p>
         </p:txBody>
       </p:sp>
     </p:spTree>
     <p:extLst>
       <p:ext uri="{BB962C8B-B14F-4D97-AF65-F5344CB8AC3E}">
-        <p14:creationId xmlns:p14="http://schemas.microsoft.com/office/powerpoint/2010/main" val="2587988589"/>
+        <p14:creationId xmlns:p14="http://schemas.microsoft.com/office/powerpoint/2010/main" val="3205240378"/>
       </p:ext>
     </p:extLst>
   </p:cSld>
@@ -5755,10 +5784,10 @@
       </p:grpSpPr>
       <p:sp>
         <p:nvSpPr>
-          <p:cNvPr id="4" name="Title 3">
+          <p:cNvPr id="2" name="Title 1">
             <a:extLst>
               <a:ext uri="{FF2B5EF4-FFF2-40B4-BE49-F238E27FC236}">
-                <a16:creationId xmlns:a16="http://schemas.microsoft.com/office/drawing/2014/main" id="{59384D36-FDB2-E34A-B67D-980B0EBB81E7}"/>
+                <a16:creationId xmlns:a16="http://schemas.microsoft.com/office/drawing/2014/main" id="{32824D08-E7EC-E3AF-58BE-275303538F0F}"/>
               </a:ext>
             </a:extLst>
           </p:cNvPr>
@@ -5778,10 +5807,35 @@
           </a:p>
         </p:txBody>
       </p:sp>
+      <p:sp>
+        <p:nvSpPr>
+          <p:cNvPr id="3" name="Content Placeholder 2">
+            <a:extLst>
+              <a:ext uri="{FF2B5EF4-FFF2-40B4-BE49-F238E27FC236}">
+                <a16:creationId xmlns:a16="http://schemas.microsoft.com/office/drawing/2014/main" id="{AAA2F44B-E6BA-C481-A8CD-C42DBD9D979E}"/>
+              </a:ext>
+            </a:extLst>
+          </p:cNvPr>
+          <p:cNvSpPr>
+            <a:spLocks noGrp="1"/>
+          </p:cNvSpPr>
+          <p:nvPr>
+            <p:ph idx="1"/>
+          </p:nvPr>
+        </p:nvSpPr>
+        <p:spPr/>
+        <p:txBody>
+          <a:bodyPr/>
+          <a:lstStyle/>
+          <a:p>
+            <a:endParaRPr lang="en-US"/>
+          </a:p>
+        </p:txBody>
+      </p:sp>
     </p:spTree>
     <p:extLst>
       <p:ext uri="{BB962C8B-B14F-4D97-AF65-F5344CB8AC3E}">
-        <p14:creationId xmlns:p14="http://schemas.microsoft.com/office/powerpoint/2010/main" val="1984196421"/>
+        <p14:creationId xmlns:p14="http://schemas.microsoft.com/office/powerpoint/2010/main" val="4117210589"/>
       </p:ext>
     </p:extLst>
   </p:cSld>
@@ -5967,7 +6021,7 @@
           <p:cNvPr id="4" name="Title 3">
             <a:extLst>
               <a:ext uri="{FF2B5EF4-FFF2-40B4-BE49-F238E27FC236}">
-                <a16:creationId xmlns:a16="http://schemas.microsoft.com/office/drawing/2014/main" id="{59384D36-FDB2-E34A-B67D-980B0EBB81E7}"/>
+                <a16:creationId xmlns:a16="http://schemas.microsoft.com/office/drawing/2014/main" id="{36B7B053-4419-46E9-90C1-BAB3FC7E108B}"/>
               </a:ext>
             </a:extLst>
           </p:cNvPr>
@@ -5975,7 +6029,7 @@
             <a:spLocks noGrp="1"/>
           </p:cNvSpPr>
           <p:nvPr>
-            <p:ph type="title"/>
+            <p:ph type="ctrTitle"/>
           </p:nvPr>
         </p:nvSpPr>
         <p:spPr/>
@@ -5983,14 +6037,17 @@
           <a:bodyPr/>
           <a:lstStyle/>
           <a:p>
-            <a:endParaRPr lang="en-US"/>
+            <a:r>
+              <a:rPr lang="en-US" dirty="0"/>
+              <a:t>Cosmos DB Integration</a:t>
+            </a:r>
           </a:p>
         </p:txBody>
       </p:sp>
     </p:spTree>
     <p:extLst>
       <p:ext uri="{BB962C8B-B14F-4D97-AF65-F5344CB8AC3E}">
-        <p14:creationId xmlns:p14="http://schemas.microsoft.com/office/powerpoint/2010/main" val="2991343468"/>
+        <p14:creationId xmlns:p14="http://schemas.microsoft.com/office/powerpoint/2010/main" val="2778200226"/>
       </p:ext>
     </p:extLst>
   </p:cSld>
@@ -6019,10 +6076,10 @@
       </p:grpSpPr>
       <p:sp>
         <p:nvSpPr>
-          <p:cNvPr id="4" name="Title 3">
+          <p:cNvPr id="2" name="Title 1">
             <a:extLst>
               <a:ext uri="{FF2B5EF4-FFF2-40B4-BE49-F238E27FC236}">
-                <a16:creationId xmlns:a16="http://schemas.microsoft.com/office/drawing/2014/main" id="{59384D36-FDB2-E34A-B67D-980B0EBB81E7}"/>
+                <a16:creationId xmlns:a16="http://schemas.microsoft.com/office/drawing/2014/main" id="{32824D08-E7EC-E3AF-58BE-275303538F0F}"/>
               </a:ext>
             </a:extLst>
           </p:cNvPr>
@@ -6038,6 +6095,34 @@
           <a:bodyPr/>
           <a:lstStyle/>
           <a:p>
+            <a:r>
+              <a:rPr lang="en-US" dirty="0"/>
+              <a:t>Synapse Link</a:t>
+            </a:r>
+          </a:p>
+        </p:txBody>
+      </p:sp>
+      <p:sp>
+        <p:nvSpPr>
+          <p:cNvPr id="3" name="Content Placeholder 2">
+            <a:extLst>
+              <a:ext uri="{FF2B5EF4-FFF2-40B4-BE49-F238E27FC236}">
+                <a16:creationId xmlns:a16="http://schemas.microsoft.com/office/drawing/2014/main" id="{AAA2F44B-E6BA-C481-A8CD-C42DBD9D979E}"/>
+              </a:ext>
+            </a:extLst>
+          </p:cNvPr>
+          <p:cNvSpPr>
+            <a:spLocks noGrp="1"/>
+          </p:cNvSpPr>
+          <p:nvPr>
+            <p:ph idx="1"/>
+          </p:nvPr>
+        </p:nvSpPr>
+        <p:spPr/>
+        <p:txBody>
+          <a:bodyPr/>
+          <a:lstStyle/>
+          <a:p>
             <a:endParaRPr lang="en-US"/>
           </a:p>
         </p:txBody>
@@ -6045,7 +6130,7 @@
     </p:spTree>
     <p:extLst>
       <p:ext uri="{BB962C8B-B14F-4D97-AF65-F5344CB8AC3E}">
-        <p14:creationId xmlns:p14="http://schemas.microsoft.com/office/powerpoint/2010/main" val="3693837431"/>
+        <p14:creationId xmlns:p14="http://schemas.microsoft.com/office/powerpoint/2010/main" val="3963307885"/>
       </p:ext>
     </p:extLst>
   </p:cSld>
@@ -6074,10 +6159,10 @@
       </p:grpSpPr>
       <p:sp>
         <p:nvSpPr>
-          <p:cNvPr id="4" name="Title 3">
+          <p:cNvPr id="2" name="Title 1">
             <a:extLst>
               <a:ext uri="{FF2B5EF4-FFF2-40B4-BE49-F238E27FC236}">
-                <a16:creationId xmlns:a16="http://schemas.microsoft.com/office/drawing/2014/main" id="{59384D36-FDB2-E34A-B67D-980B0EBB81E7}"/>
+                <a16:creationId xmlns:a16="http://schemas.microsoft.com/office/drawing/2014/main" id="{32824D08-E7EC-E3AF-58BE-275303538F0F}"/>
               </a:ext>
             </a:extLst>
           </p:cNvPr>
@@ -6093,6 +6178,34 @@
           <a:bodyPr/>
           <a:lstStyle/>
           <a:p>
+            <a:r>
+              <a:rPr lang="en-US" dirty="0"/>
+              <a:t>Private Endpoints</a:t>
+            </a:r>
+          </a:p>
+        </p:txBody>
+      </p:sp>
+      <p:sp>
+        <p:nvSpPr>
+          <p:cNvPr id="3" name="Content Placeholder 2">
+            <a:extLst>
+              <a:ext uri="{FF2B5EF4-FFF2-40B4-BE49-F238E27FC236}">
+                <a16:creationId xmlns:a16="http://schemas.microsoft.com/office/drawing/2014/main" id="{AAA2F44B-E6BA-C481-A8CD-C42DBD9D979E}"/>
+              </a:ext>
+            </a:extLst>
+          </p:cNvPr>
+          <p:cNvSpPr>
+            <a:spLocks noGrp="1"/>
+          </p:cNvSpPr>
+          <p:nvPr>
+            <p:ph idx="1"/>
+          </p:nvPr>
+        </p:nvSpPr>
+        <p:spPr/>
+        <p:txBody>
+          <a:bodyPr/>
+          <a:lstStyle/>
+          <a:p>
             <a:endParaRPr lang="en-US"/>
           </a:p>
         </p:txBody>
@@ -6100,7 +6213,7 @@
     </p:spTree>
     <p:extLst>
       <p:ext uri="{BB962C8B-B14F-4D97-AF65-F5344CB8AC3E}">
-        <p14:creationId xmlns:p14="http://schemas.microsoft.com/office/powerpoint/2010/main" val="1065297884"/>
+        <p14:creationId xmlns:p14="http://schemas.microsoft.com/office/powerpoint/2010/main" val="3774322654"/>
       </p:ext>
     </p:extLst>
   </p:cSld>
@@ -6132,7 +6245,7 @@
           <p:cNvPr id="4" name="Title 3">
             <a:extLst>
               <a:ext uri="{FF2B5EF4-FFF2-40B4-BE49-F238E27FC236}">
-                <a16:creationId xmlns:a16="http://schemas.microsoft.com/office/drawing/2014/main" id="{59384D36-FDB2-E34A-B67D-980B0EBB81E7}"/>
+                <a16:creationId xmlns:a16="http://schemas.microsoft.com/office/drawing/2014/main" id="{36B7B053-4419-46E9-90C1-BAB3FC7E108B}"/>
               </a:ext>
             </a:extLst>
           </p:cNvPr>
@@ -6140,7 +6253,7 @@
             <a:spLocks noGrp="1"/>
           </p:cNvSpPr>
           <p:nvPr>
-            <p:ph type="title"/>
+            <p:ph type="ctrTitle"/>
           </p:nvPr>
         </p:nvSpPr>
         <p:spPr/>
@@ -6148,14 +6261,17 @@
           <a:bodyPr/>
           <a:lstStyle/>
           <a:p>
-            <a:endParaRPr lang="en-US"/>
+            <a:r>
+              <a:rPr lang="en-US" dirty="0"/>
+              <a:t>Cosmos DB Monitoring and Optimization</a:t>
+            </a:r>
           </a:p>
         </p:txBody>
       </p:sp>
     </p:spTree>
     <p:extLst>
       <p:ext uri="{BB962C8B-B14F-4D97-AF65-F5344CB8AC3E}">
-        <p14:creationId xmlns:p14="http://schemas.microsoft.com/office/powerpoint/2010/main" val="2944078570"/>
+        <p14:creationId xmlns:p14="http://schemas.microsoft.com/office/powerpoint/2010/main" val="1949589790"/>
       </p:ext>
     </p:extLst>
   </p:cSld>
@@ -6184,10 +6300,10 @@
       </p:grpSpPr>
       <p:sp>
         <p:nvSpPr>
-          <p:cNvPr id="4" name="Title 3">
+          <p:cNvPr id="2" name="Title 1">
             <a:extLst>
               <a:ext uri="{FF2B5EF4-FFF2-40B4-BE49-F238E27FC236}">
-                <a16:creationId xmlns:a16="http://schemas.microsoft.com/office/drawing/2014/main" id="{59384D36-FDB2-E34A-B67D-980B0EBB81E7}"/>
+                <a16:creationId xmlns:a16="http://schemas.microsoft.com/office/drawing/2014/main" id="{32824D08-E7EC-E3AF-58BE-275303538F0F}"/>
               </a:ext>
             </a:extLst>
           </p:cNvPr>
@@ -6207,10 +6323,35 @@
           </a:p>
         </p:txBody>
       </p:sp>
+      <p:sp>
+        <p:nvSpPr>
+          <p:cNvPr id="3" name="Content Placeholder 2">
+            <a:extLst>
+              <a:ext uri="{FF2B5EF4-FFF2-40B4-BE49-F238E27FC236}">
+                <a16:creationId xmlns:a16="http://schemas.microsoft.com/office/drawing/2014/main" id="{AAA2F44B-E6BA-C481-A8CD-C42DBD9D979E}"/>
+              </a:ext>
+            </a:extLst>
+          </p:cNvPr>
+          <p:cNvSpPr>
+            <a:spLocks noGrp="1"/>
+          </p:cNvSpPr>
+          <p:nvPr>
+            <p:ph idx="1"/>
+          </p:nvPr>
+        </p:nvSpPr>
+        <p:spPr/>
+        <p:txBody>
+          <a:bodyPr/>
+          <a:lstStyle/>
+          <a:p>
+            <a:endParaRPr lang="en-US"/>
+          </a:p>
+        </p:txBody>
+      </p:sp>
     </p:spTree>
     <p:extLst>
       <p:ext uri="{BB962C8B-B14F-4D97-AF65-F5344CB8AC3E}">
-        <p14:creationId xmlns:p14="http://schemas.microsoft.com/office/powerpoint/2010/main" val="3062926759"/>
+        <p14:creationId xmlns:p14="http://schemas.microsoft.com/office/powerpoint/2010/main" val="4118470424"/>
       </p:ext>
     </p:extLst>
   </p:cSld>
@@ -6265,7 +6406,7 @@
     </p:spTree>
     <p:extLst>
       <p:ext uri="{BB962C8B-B14F-4D97-AF65-F5344CB8AC3E}">
-        <p14:creationId xmlns:p14="http://schemas.microsoft.com/office/powerpoint/2010/main" val="1358776391"/>
+        <p14:creationId xmlns:p14="http://schemas.microsoft.com/office/powerpoint/2010/main" val="2587988589"/>
       </p:ext>
     </p:extLst>
   </p:cSld>
@@ -6320,7 +6461,7 @@
     </p:spTree>
     <p:extLst>
       <p:ext uri="{BB962C8B-B14F-4D97-AF65-F5344CB8AC3E}">
-        <p14:creationId xmlns:p14="http://schemas.microsoft.com/office/powerpoint/2010/main" val="1151839797"/>
+        <p14:creationId xmlns:p14="http://schemas.microsoft.com/office/powerpoint/2010/main" val="1984196421"/>
       </p:ext>
     </p:extLst>
   </p:cSld>
@@ -6375,7 +6516,7 @@
     </p:spTree>
     <p:extLst>
       <p:ext uri="{BB962C8B-B14F-4D97-AF65-F5344CB8AC3E}">
-        <p14:creationId xmlns:p14="http://schemas.microsoft.com/office/powerpoint/2010/main" val="1853520212"/>
+        <p14:creationId xmlns:p14="http://schemas.microsoft.com/office/powerpoint/2010/main" val="2991343468"/>
       </p:ext>
     </p:extLst>
   </p:cSld>
@@ -6430,7 +6571,7 @@
     </p:spTree>
     <p:extLst>
       <p:ext uri="{BB962C8B-B14F-4D97-AF65-F5344CB8AC3E}">
-        <p14:creationId xmlns:p14="http://schemas.microsoft.com/office/powerpoint/2010/main" val="4159323253"/>
+        <p14:creationId xmlns:p14="http://schemas.microsoft.com/office/powerpoint/2010/main" val="3693837431"/>
       </p:ext>
     </p:extLst>
   </p:cSld>
@@ -6485,7 +6626,7 @@
     </p:spTree>
     <p:extLst>
       <p:ext uri="{BB962C8B-B14F-4D97-AF65-F5344CB8AC3E}">
-        <p14:creationId xmlns:p14="http://schemas.microsoft.com/office/powerpoint/2010/main" val="1784013207"/>
+        <p14:creationId xmlns:p14="http://schemas.microsoft.com/office/powerpoint/2010/main" val="1065297884"/>
       </p:ext>
     </p:extLst>
   </p:cSld>
@@ -6578,19 +6719,844 @@
               <a:t>Design and implement data distribution (5–10%)</a:t>
             </a:r>
           </a:p>
-          <a:p>
-            <a:r>
-              <a:rPr lang="en-GB" dirty="0"/>
-              <a:t>Integrate an Azure Cosmos DB solution (5–10%)</a:t>
-            </a:r>
-            <a:endParaRPr lang="en-US" dirty="0"/>
-          </a:p>
         </p:txBody>
       </p:sp>
     </p:spTree>
     <p:extLst>
       <p:ext uri="{BB962C8B-B14F-4D97-AF65-F5344CB8AC3E}">
         <p14:creationId xmlns:p14="http://schemas.microsoft.com/office/powerpoint/2010/main" val="1257478528"/>
+      </p:ext>
+    </p:extLst>
+  </p:cSld>
+  <p:clrMapOvr>
+    <a:masterClrMapping/>
+  </p:clrMapOvr>
+  <p:timing>
+    <p:tnLst>
+      <p:par>
+        <p:cTn id="1" dur="indefinite" restart="never" nodeType="tmRoot">
+          <p:childTnLst>
+            <p:seq concurrent="1" nextAc="seek">
+              <p:cTn id="2" dur="indefinite" nodeType="mainSeq">
+                <p:childTnLst>
+                  <p:par>
+                    <p:cTn id="3" fill="hold">
+                      <p:stCondLst>
+                        <p:cond delay="indefinite"/>
+                      </p:stCondLst>
+                      <p:childTnLst>
+                        <p:par>
+                          <p:cTn id="4" fill="hold">
+                            <p:stCondLst>
+                              <p:cond delay="0"/>
+                            </p:stCondLst>
+                            <p:childTnLst>
+                              <p:par>
+                                <p:cTn id="5" presetID="1" presetClass="entr" presetSubtype="0" fill="hold" nodeType="clickEffect">
+                                  <p:stCondLst>
+                                    <p:cond delay="0"/>
+                                  </p:stCondLst>
+                                  <p:childTnLst>
+                                    <p:set>
+                                      <p:cBhvr>
+                                        <p:cTn id="6" dur="1" fill="hold">
+                                          <p:stCondLst>
+                                            <p:cond delay="0"/>
+                                          </p:stCondLst>
+                                        </p:cTn>
+                                        <p:tgtEl>
+                                          <p:spTgt spid="3">
+                                            <p:txEl>
+                                              <p:pRg st="0" end="0"/>
+                                            </p:txEl>
+                                          </p:spTgt>
+                                        </p:tgtEl>
+                                        <p:attrNameLst>
+                                          <p:attrName>style.visibility</p:attrName>
+                                        </p:attrNameLst>
+                                      </p:cBhvr>
+                                      <p:to>
+                                        <p:strVal val="visible"/>
+                                      </p:to>
+                                    </p:set>
+                                  </p:childTnLst>
+                                </p:cTn>
+                              </p:par>
+                            </p:childTnLst>
+                          </p:cTn>
+                        </p:par>
+                      </p:childTnLst>
+                    </p:cTn>
+                  </p:par>
+                  <p:par>
+                    <p:cTn id="7" fill="hold">
+                      <p:stCondLst>
+                        <p:cond delay="indefinite"/>
+                      </p:stCondLst>
+                      <p:childTnLst>
+                        <p:par>
+                          <p:cTn id="8" fill="hold">
+                            <p:stCondLst>
+                              <p:cond delay="0"/>
+                            </p:stCondLst>
+                            <p:childTnLst>
+                              <p:par>
+                                <p:cTn id="9" presetID="1" presetClass="entr" presetSubtype="0" fill="hold" nodeType="clickEffect">
+                                  <p:stCondLst>
+                                    <p:cond delay="0"/>
+                                  </p:stCondLst>
+                                  <p:childTnLst>
+                                    <p:set>
+                                      <p:cBhvr>
+                                        <p:cTn id="10" dur="1" fill="hold">
+                                          <p:stCondLst>
+                                            <p:cond delay="0"/>
+                                          </p:stCondLst>
+                                        </p:cTn>
+                                        <p:tgtEl>
+                                          <p:spTgt spid="3">
+                                            <p:txEl>
+                                              <p:pRg st="1" end="1"/>
+                                            </p:txEl>
+                                          </p:spTgt>
+                                        </p:tgtEl>
+                                        <p:attrNameLst>
+                                          <p:attrName>style.visibility</p:attrName>
+                                        </p:attrNameLst>
+                                      </p:cBhvr>
+                                      <p:to>
+                                        <p:strVal val="visible"/>
+                                      </p:to>
+                                    </p:set>
+                                  </p:childTnLst>
+                                </p:cTn>
+                              </p:par>
+                            </p:childTnLst>
+                          </p:cTn>
+                        </p:par>
+                      </p:childTnLst>
+                    </p:cTn>
+                  </p:par>
+                  <p:par>
+                    <p:cTn id="11" fill="hold">
+                      <p:stCondLst>
+                        <p:cond delay="indefinite"/>
+                      </p:stCondLst>
+                      <p:childTnLst>
+                        <p:par>
+                          <p:cTn id="12" fill="hold">
+                            <p:stCondLst>
+                              <p:cond delay="0"/>
+                            </p:stCondLst>
+                            <p:childTnLst>
+                              <p:par>
+                                <p:cTn id="13" presetID="1" presetClass="entr" presetSubtype="0" fill="hold" nodeType="clickEffect">
+                                  <p:stCondLst>
+                                    <p:cond delay="0"/>
+                                  </p:stCondLst>
+                                  <p:childTnLst>
+                                    <p:set>
+                                      <p:cBhvr>
+                                        <p:cTn id="14" dur="1" fill="hold">
+                                          <p:stCondLst>
+                                            <p:cond delay="0"/>
+                                          </p:stCondLst>
+                                        </p:cTn>
+                                        <p:tgtEl>
+                                          <p:spTgt spid="3">
+                                            <p:txEl>
+                                              <p:pRg st="2" end="2"/>
+                                            </p:txEl>
+                                          </p:spTgt>
+                                        </p:tgtEl>
+                                        <p:attrNameLst>
+                                          <p:attrName>style.visibility</p:attrName>
+                                        </p:attrNameLst>
+                                      </p:cBhvr>
+                                      <p:to>
+                                        <p:strVal val="visible"/>
+                                      </p:to>
+                                    </p:set>
+                                  </p:childTnLst>
+                                </p:cTn>
+                              </p:par>
+                            </p:childTnLst>
+                          </p:cTn>
+                        </p:par>
+                      </p:childTnLst>
+                    </p:cTn>
+                  </p:par>
+                </p:childTnLst>
+              </p:cTn>
+              <p:prevCondLst>
+                <p:cond evt="onPrev" delay="0">
+                  <p:tgtEl>
+                    <p:sldTgt/>
+                  </p:tgtEl>
+                </p:cond>
+              </p:prevCondLst>
+              <p:nextCondLst>
+                <p:cond evt="onNext" delay="0">
+                  <p:tgtEl>
+                    <p:sldTgt/>
+                  </p:tgtEl>
+                </p:cond>
+              </p:nextCondLst>
+            </p:seq>
+          </p:childTnLst>
+        </p:cTn>
+      </p:par>
+    </p:tnLst>
+  </p:timing>
+</p:sld>
+</file>
+
+<file path=ppt/slides/slide30.xml><?xml version="1.0" encoding="utf-8"?>
+<p:sld xmlns:a="http://schemas.openxmlformats.org/drawingml/2006/main" xmlns:r="http://schemas.openxmlformats.org/officeDocument/2006/relationships" xmlns:p="http://schemas.openxmlformats.org/presentationml/2006/main">
+  <p:cSld>
+    <p:spTree>
+      <p:nvGrpSpPr>
+        <p:cNvPr id="1" name=""/>
+        <p:cNvGrpSpPr/>
+        <p:nvPr/>
+      </p:nvGrpSpPr>
+      <p:grpSpPr>
+        <a:xfrm>
+          <a:off x="0" y="0"/>
+          <a:ext cx="0" cy="0"/>
+          <a:chOff x="0" y="0"/>
+          <a:chExt cx="0" cy="0"/>
+        </a:xfrm>
+      </p:grpSpPr>
+      <p:sp>
+        <p:nvSpPr>
+          <p:cNvPr id="4" name="Title 3">
+            <a:extLst>
+              <a:ext uri="{FF2B5EF4-FFF2-40B4-BE49-F238E27FC236}">
+                <a16:creationId xmlns:a16="http://schemas.microsoft.com/office/drawing/2014/main" id="{59384D36-FDB2-E34A-B67D-980B0EBB81E7}"/>
+              </a:ext>
+            </a:extLst>
+          </p:cNvPr>
+          <p:cNvSpPr>
+            <a:spLocks noGrp="1"/>
+          </p:cNvSpPr>
+          <p:nvPr>
+            <p:ph type="title"/>
+          </p:nvPr>
+        </p:nvSpPr>
+        <p:spPr/>
+        <p:txBody>
+          <a:bodyPr/>
+          <a:lstStyle/>
+          <a:p>
+            <a:endParaRPr lang="en-US"/>
+          </a:p>
+        </p:txBody>
+      </p:sp>
+    </p:spTree>
+    <p:extLst>
+      <p:ext uri="{BB962C8B-B14F-4D97-AF65-F5344CB8AC3E}">
+        <p14:creationId xmlns:p14="http://schemas.microsoft.com/office/powerpoint/2010/main" val="2944078570"/>
+      </p:ext>
+    </p:extLst>
+  </p:cSld>
+  <p:clrMapOvr>
+    <a:masterClrMapping/>
+  </p:clrMapOvr>
+</p:sld>
+</file>
+
+<file path=ppt/slides/slide31.xml><?xml version="1.0" encoding="utf-8"?>
+<p:sld xmlns:a="http://schemas.openxmlformats.org/drawingml/2006/main" xmlns:r="http://schemas.openxmlformats.org/officeDocument/2006/relationships" xmlns:p="http://schemas.openxmlformats.org/presentationml/2006/main">
+  <p:cSld>
+    <p:spTree>
+      <p:nvGrpSpPr>
+        <p:cNvPr id="1" name=""/>
+        <p:cNvGrpSpPr/>
+        <p:nvPr/>
+      </p:nvGrpSpPr>
+      <p:grpSpPr>
+        <a:xfrm>
+          <a:off x="0" y="0"/>
+          <a:ext cx="0" cy="0"/>
+          <a:chOff x="0" y="0"/>
+          <a:chExt cx="0" cy="0"/>
+        </a:xfrm>
+      </p:grpSpPr>
+      <p:sp>
+        <p:nvSpPr>
+          <p:cNvPr id="4" name="Title 3">
+            <a:extLst>
+              <a:ext uri="{FF2B5EF4-FFF2-40B4-BE49-F238E27FC236}">
+                <a16:creationId xmlns:a16="http://schemas.microsoft.com/office/drawing/2014/main" id="{59384D36-FDB2-E34A-B67D-980B0EBB81E7}"/>
+              </a:ext>
+            </a:extLst>
+          </p:cNvPr>
+          <p:cNvSpPr>
+            <a:spLocks noGrp="1"/>
+          </p:cNvSpPr>
+          <p:nvPr>
+            <p:ph type="title"/>
+          </p:nvPr>
+        </p:nvSpPr>
+        <p:spPr/>
+        <p:txBody>
+          <a:bodyPr/>
+          <a:lstStyle/>
+          <a:p>
+            <a:endParaRPr lang="en-US"/>
+          </a:p>
+        </p:txBody>
+      </p:sp>
+    </p:spTree>
+    <p:extLst>
+      <p:ext uri="{BB962C8B-B14F-4D97-AF65-F5344CB8AC3E}">
+        <p14:creationId xmlns:p14="http://schemas.microsoft.com/office/powerpoint/2010/main" val="3062926759"/>
+      </p:ext>
+    </p:extLst>
+  </p:cSld>
+  <p:clrMapOvr>
+    <a:masterClrMapping/>
+  </p:clrMapOvr>
+</p:sld>
+</file>
+
+<file path=ppt/slides/slide32.xml><?xml version="1.0" encoding="utf-8"?>
+<p:sld xmlns:a="http://schemas.openxmlformats.org/drawingml/2006/main" xmlns:r="http://schemas.openxmlformats.org/officeDocument/2006/relationships" xmlns:p="http://schemas.openxmlformats.org/presentationml/2006/main">
+  <p:cSld>
+    <p:spTree>
+      <p:nvGrpSpPr>
+        <p:cNvPr id="1" name=""/>
+        <p:cNvGrpSpPr/>
+        <p:nvPr/>
+      </p:nvGrpSpPr>
+      <p:grpSpPr>
+        <a:xfrm>
+          <a:off x="0" y="0"/>
+          <a:ext cx="0" cy="0"/>
+          <a:chOff x="0" y="0"/>
+          <a:chExt cx="0" cy="0"/>
+        </a:xfrm>
+      </p:grpSpPr>
+      <p:sp>
+        <p:nvSpPr>
+          <p:cNvPr id="4" name="Title 3">
+            <a:extLst>
+              <a:ext uri="{FF2B5EF4-FFF2-40B4-BE49-F238E27FC236}">
+                <a16:creationId xmlns:a16="http://schemas.microsoft.com/office/drawing/2014/main" id="{59384D36-FDB2-E34A-B67D-980B0EBB81E7}"/>
+              </a:ext>
+            </a:extLst>
+          </p:cNvPr>
+          <p:cNvSpPr>
+            <a:spLocks noGrp="1"/>
+          </p:cNvSpPr>
+          <p:nvPr>
+            <p:ph type="title"/>
+          </p:nvPr>
+        </p:nvSpPr>
+        <p:spPr/>
+        <p:txBody>
+          <a:bodyPr/>
+          <a:lstStyle/>
+          <a:p>
+            <a:endParaRPr lang="en-US"/>
+          </a:p>
+        </p:txBody>
+      </p:sp>
+    </p:spTree>
+    <p:extLst>
+      <p:ext uri="{BB962C8B-B14F-4D97-AF65-F5344CB8AC3E}">
+        <p14:creationId xmlns:p14="http://schemas.microsoft.com/office/powerpoint/2010/main" val="1358776391"/>
+      </p:ext>
+    </p:extLst>
+  </p:cSld>
+  <p:clrMapOvr>
+    <a:masterClrMapping/>
+  </p:clrMapOvr>
+</p:sld>
+</file>
+
+<file path=ppt/slides/slide33.xml><?xml version="1.0" encoding="utf-8"?>
+<p:sld xmlns:a="http://schemas.openxmlformats.org/drawingml/2006/main" xmlns:r="http://schemas.openxmlformats.org/officeDocument/2006/relationships" xmlns:p="http://schemas.openxmlformats.org/presentationml/2006/main">
+  <p:cSld>
+    <p:spTree>
+      <p:nvGrpSpPr>
+        <p:cNvPr id="1" name=""/>
+        <p:cNvGrpSpPr/>
+        <p:nvPr/>
+      </p:nvGrpSpPr>
+      <p:grpSpPr>
+        <a:xfrm>
+          <a:off x="0" y="0"/>
+          <a:ext cx="0" cy="0"/>
+          <a:chOff x="0" y="0"/>
+          <a:chExt cx="0" cy="0"/>
+        </a:xfrm>
+      </p:grpSpPr>
+      <p:sp>
+        <p:nvSpPr>
+          <p:cNvPr id="4" name="Title 3">
+            <a:extLst>
+              <a:ext uri="{FF2B5EF4-FFF2-40B4-BE49-F238E27FC236}">
+                <a16:creationId xmlns:a16="http://schemas.microsoft.com/office/drawing/2014/main" id="{59384D36-FDB2-E34A-B67D-980B0EBB81E7}"/>
+              </a:ext>
+            </a:extLst>
+          </p:cNvPr>
+          <p:cNvSpPr>
+            <a:spLocks noGrp="1"/>
+          </p:cNvSpPr>
+          <p:nvPr>
+            <p:ph type="title"/>
+          </p:nvPr>
+        </p:nvSpPr>
+        <p:spPr/>
+        <p:txBody>
+          <a:bodyPr/>
+          <a:lstStyle/>
+          <a:p>
+            <a:endParaRPr lang="en-US"/>
+          </a:p>
+        </p:txBody>
+      </p:sp>
+    </p:spTree>
+    <p:extLst>
+      <p:ext uri="{BB962C8B-B14F-4D97-AF65-F5344CB8AC3E}">
+        <p14:creationId xmlns:p14="http://schemas.microsoft.com/office/powerpoint/2010/main" val="1151839797"/>
+      </p:ext>
+    </p:extLst>
+  </p:cSld>
+  <p:clrMapOvr>
+    <a:masterClrMapping/>
+  </p:clrMapOvr>
+</p:sld>
+</file>
+
+<file path=ppt/slides/slide34.xml><?xml version="1.0" encoding="utf-8"?>
+<p:sld xmlns:a="http://schemas.openxmlformats.org/drawingml/2006/main" xmlns:r="http://schemas.openxmlformats.org/officeDocument/2006/relationships" xmlns:p="http://schemas.openxmlformats.org/presentationml/2006/main">
+  <p:cSld>
+    <p:spTree>
+      <p:nvGrpSpPr>
+        <p:cNvPr id="1" name=""/>
+        <p:cNvGrpSpPr/>
+        <p:nvPr/>
+      </p:nvGrpSpPr>
+      <p:grpSpPr>
+        <a:xfrm>
+          <a:off x="0" y="0"/>
+          <a:ext cx="0" cy="0"/>
+          <a:chOff x="0" y="0"/>
+          <a:chExt cx="0" cy="0"/>
+        </a:xfrm>
+      </p:grpSpPr>
+      <p:sp>
+        <p:nvSpPr>
+          <p:cNvPr id="4" name="Title 3">
+            <a:extLst>
+              <a:ext uri="{FF2B5EF4-FFF2-40B4-BE49-F238E27FC236}">
+                <a16:creationId xmlns:a16="http://schemas.microsoft.com/office/drawing/2014/main" id="{59384D36-FDB2-E34A-B67D-980B0EBB81E7}"/>
+              </a:ext>
+            </a:extLst>
+          </p:cNvPr>
+          <p:cNvSpPr>
+            <a:spLocks noGrp="1"/>
+          </p:cNvSpPr>
+          <p:nvPr>
+            <p:ph type="title"/>
+          </p:nvPr>
+        </p:nvSpPr>
+        <p:spPr/>
+        <p:txBody>
+          <a:bodyPr/>
+          <a:lstStyle/>
+          <a:p>
+            <a:endParaRPr lang="en-US"/>
+          </a:p>
+        </p:txBody>
+      </p:sp>
+    </p:spTree>
+    <p:extLst>
+      <p:ext uri="{BB962C8B-B14F-4D97-AF65-F5344CB8AC3E}">
+        <p14:creationId xmlns:p14="http://schemas.microsoft.com/office/powerpoint/2010/main" val="1853520212"/>
+      </p:ext>
+    </p:extLst>
+  </p:cSld>
+  <p:clrMapOvr>
+    <a:masterClrMapping/>
+  </p:clrMapOvr>
+</p:sld>
+</file>
+
+<file path=ppt/slides/slide35.xml><?xml version="1.0" encoding="utf-8"?>
+<p:sld xmlns:a="http://schemas.openxmlformats.org/drawingml/2006/main" xmlns:r="http://schemas.openxmlformats.org/officeDocument/2006/relationships" xmlns:p="http://schemas.openxmlformats.org/presentationml/2006/main">
+  <p:cSld>
+    <p:spTree>
+      <p:nvGrpSpPr>
+        <p:cNvPr id="1" name=""/>
+        <p:cNvGrpSpPr/>
+        <p:nvPr/>
+      </p:nvGrpSpPr>
+      <p:grpSpPr>
+        <a:xfrm>
+          <a:off x="0" y="0"/>
+          <a:ext cx="0" cy="0"/>
+          <a:chOff x="0" y="0"/>
+          <a:chExt cx="0" cy="0"/>
+        </a:xfrm>
+      </p:grpSpPr>
+      <p:sp>
+        <p:nvSpPr>
+          <p:cNvPr id="4" name="Title 3">
+            <a:extLst>
+              <a:ext uri="{FF2B5EF4-FFF2-40B4-BE49-F238E27FC236}">
+                <a16:creationId xmlns:a16="http://schemas.microsoft.com/office/drawing/2014/main" id="{59384D36-FDB2-E34A-B67D-980B0EBB81E7}"/>
+              </a:ext>
+            </a:extLst>
+          </p:cNvPr>
+          <p:cNvSpPr>
+            <a:spLocks noGrp="1"/>
+          </p:cNvSpPr>
+          <p:nvPr>
+            <p:ph type="title"/>
+          </p:nvPr>
+        </p:nvSpPr>
+        <p:spPr/>
+        <p:txBody>
+          <a:bodyPr/>
+          <a:lstStyle/>
+          <a:p>
+            <a:endParaRPr lang="en-US"/>
+          </a:p>
+        </p:txBody>
+      </p:sp>
+    </p:spTree>
+    <p:extLst>
+      <p:ext uri="{BB962C8B-B14F-4D97-AF65-F5344CB8AC3E}">
+        <p14:creationId xmlns:p14="http://schemas.microsoft.com/office/powerpoint/2010/main" val="4159323253"/>
+      </p:ext>
+    </p:extLst>
+  </p:cSld>
+  <p:clrMapOvr>
+    <a:masterClrMapping/>
+  </p:clrMapOvr>
+</p:sld>
+</file>
+
+<file path=ppt/slides/slide36.xml><?xml version="1.0" encoding="utf-8"?>
+<p:sld xmlns:a="http://schemas.openxmlformats.org/drawingml/2006/main" xmlns:r="http://schemas.openxmlformats.org/officeDocument/2006/relationships" xmlns:p="http://schemas.openxmlformats.org/presentationml/2006/main">
+  <p:cSld>
+    <p:spTree>
+      <p:nvGrpSpPr>
+        <p:cNvPr id="1" name=""/>
+        <p:cNvGrpSpPr/>
+        <p:nvPr/>
+      </p:nvGrpSpPr>
+      <p:grpSpPr>
+        <a:xfrm>
+          <a:off x="0" y="0"/>
+          <a:ext cx="0" cy="0"/>
+          <a:chOff x="0" y="0"/>
+          <a:chExt cx="0" cy="0"/>
+        </a:xfrm>
+      </p:grpSpPr>
+      <p:sp>
+        <p:nvSpPr>
+          <p:cNvPr id="4" name="Title 3">
+            <a:extLst>
+              <a:ext uri="{FF2B5EF4-FFF2-40B4-BE49-F238E27FC236}">
+                <a16:creationId xmlns:a16="http://schemas.microsoft.com/office/drawing/2014/main" id="{59384D36-FDB2-E34A-B67D-980B0EBB81E7}"/>
+              </a:ext>
+            </a:extLst>
+          </p:cNvPr>
+          <p:cNvSpPr>
+            <a:spLocks noGrp="1"/>
+          </p:cNvSpPr>
+          <p:nvPr>
+            <p:ph type="title"/>
+          </p:nvPr>
+        </p:nvSpPr>
+        <p:spPr/>
+        <p:txBody>
+          <a:bodyPr/>
+          <a:lstStyle/>
+          <a:p>
+            <a:endParaRPr lang="en-US"/>
+          </a:p>
+        </p:txBody>
+      </p:sp>
+    </p:spTree>
+    <p:extLst>
+      <p:ext uri="{BB962C8B-B14F-4D97-AF65-F5344CB8AC3E}">
+        <p14:creationId xmlns:p14="http://schemas.microsoft.com/office/powerpoint/2010/main" val="1784013207"/>
+      </p:ext>
+    </p:extLst>
+  </p:cSld>
+  <p:clrMapOvr>
+    <a:masterClrMapping/>
+  </p:clrMapOvr>
+</p:sld>
+</file>
+
+<file path=ppt/slides/slide37.xml><?xml version="1.0" encoding="utf-8"?>
+<p:sld xmlns:a="http://schemas.openxmlformats.org/drawingml/2006/main" xmlns:r="http://schemas.openxmlformats.org/officeDocument/2006/relationships" xmlns:p="http://schemas.openxmlformats.org/presentationml/2006/main">
+  <p:cSld>
+    <p:spTree>
+      <p:nvGrpSpPr>
+        <p:cNvPr id="1" name=""/>
+        <p:cNvGrpSpPr/>
+        <p:nvPr/>
+      </p:nvGrpSpPr>
+      <p:grpSpPr>
+        <a:xfrm>
+          <a:off x="0" y="0"/>
+          <a:ext cx="0" cy="0"/>
+          <a:chOff x="0" y="0"/>
+          <a:chExt cx="0" cy="0"/>
+        </a:xfrm>
+      </p:grpSpPr>
+      <p:sp>
+        <p:nvSpPr>
+          <p:cNvPr id="4" name="Title 3">
+            <a:extLst>
+              <a:ext uri="{FF2B5EF4-FFF2-40B4-BE49-F238E27FC236}">
+                <a16:creationId xmlns:a16="http://schemas.microsoft.com/office/drawing/2014/main" id="{59384D36-FDB2-E34A-B67D-980B0EBB81E7}"/>
+              </a:ext>
+            </a:extLst>
+          </p:cNvPr>
+          <p:cNvSpPr>
+            <a:spLocks noGrp="1"/>
+          </p:cNvSpPr>
+          <p:nvPr>
+            <p:ph type="title"/>
+          </p:nvPr>
+        </p:nvSpPr>
+        <p:spPr/>
+        <p:txBody>
+          <a:bodyPr/>
+          <a:lstStyle/>
+          <a:p>
+            <a:endParaRPr lang="en-US"/>
+          </a:p>
+        </p:txBody>
+      </p:sp>
+    </p:spTree>
+    <p:extLst>
+      <p:ext uri="{BB962C8B-B14F-4D97-AF65-F5344CB8AC3E}">
+        <p14:creationId xmlns:p14="http://schemas.microsoft.com/office/powerpoint/2010/main" val="2435013405"/>
+      </p:ext>
+    </p:extLst>
+  </p:cSld>
+  <p:clrMapOvr>
+    <a:masterClrMapping/>
+  </p:clrMapOvr>
+</p:sld>
+</file>
+
+<file path=ppt/slides/slide38.xml><?xml version="1.0" encoding="utf-8"?>
+<p:sld xmlns:a="http://schemas.openxmlformats.org/drawingml/2006/main" xmlns:r="http://schemas.openxmlformats.org/officeDocument/2006/relationships" xmlns:p="http://schemas.openxmlformats.org/presentationml/2006/main">
+  <p:cSld>
+    <p:spTree>
+      <p:nvGrpSpPr>
+        <p:cNvPr id="1" name=""/>
+        <p:cNvGrpSpPr/>
+        <p:nvPr/>
+      </p:nvGrpSpPr>
+      <p:grpSpPr>
+        <a:xfrm>
+          <a:off x="0" y="0"/>
+          <a:ext cx="0" cy="0"/>
+          <a:chOff x="0" y="0"/>
+          <a:chExt cx="0" cy="0"/>
+        </a:xfrm>
+      </p:grpSpPr>
+      <p:sp>
+        <p:nvSpPr>
+          <p:cNvPr id="4" name="Title 3">
+            <a:extLst>
+              <a:ext uri="{FF2B5EF4-FFF2-40B4-BE49-F238E27FC236}">
+                <a16:creationId xmlns:a16="http://schemas.microsoft.com/office/drawing/2014/main" id="{59384D36-FDB2-E34A-B67D-980B0EBB81E7}"/>
+              </a:ext>
+            </a:extLst>
+          </p:cNvPr>
+          <p:cNvSpPr>
+            <a:spLocks noGrp="1"/>
+          </p:cNvSpPr>
+          <p:nvPr>
+            <p:ph type="title"/>
+          </p:nvPr>
+        </p:nvSpPr>
+        <p:spPr/>
+        <p:txBody>
+          <a:bodyPr/>
+          <a:lstStyle/>
+          <a:p>
+            <a:endParaRPr lang="en-US"/>
+          </a:p>
+        </p:txBody>
+      </p:sp>
+    </p:spTree>
+    <p:extLst>
+      <p:ext uri="{BB962C8B-B14F-4D97-AF65-F5344CB8AC3E}">
+        <p14:creationId xmlns:p14="http://schemas.microsoft.com/office/powerpoint/2010/main" val="2641826243"/>
+      </p:ext>
+    </p:extLst>
+  </p:cSld>
+  <p:clrMapOvr>
+    <a:masterClrMapping/>
+  </p:clrMapOvr>
+</p:sld>
+</file>
+
+<file path=ppt/slides/slide39.xml><?xml version="1.0" encoding="utf-8"?>
+<p:sld xmlns:a="http://schemas.openxmlformats.org/drawingml/2006/main" xmlns:r="http://schemas.openxmlformats.org/officeDocument/2006/relationships" xmlns:p="http://schemas.openxmlformats.org/presentationml/2006/main">
+  <p:cSld>
+    <p:spTree>
+      <p:nvGrpSpPr>
+        <p:cNvPr id="1" name=""/>
+        <p:cNvGrpSpPr/>
+        <p:nvPr/>
+      </p:nvGrpSpPr>
+      <p:grpSpPr>
+        <a:xfrm>
+          <a:off x="0" y="0"/>
+          <a:ext cx="0" cy="0"/>
+          <a:chOff x="0" y="0"/>
+          <a:chExt cx="0" cy="0"/>
+        </a:xfrm>
+      </p:grpSpPr>
+      <p:sp>
+        <p:nvSpPr>
+          <p:cNvPr id="4" name="Title 3">
+            <a:extLst>
+              <a:ext uri="{FF2B5EF4-FFF2-40B4-BE49-F238E27FC236}">
+                <a16:creationId xmlns:a16="http://schemas.microsoft.com/office/drawing/2014/main" id="{59384D36-FDB2-E34A-B67D-980B0EBB81E7}"/>
+              </a:ext>
+            </a:extLst>
+          </p:cNvPr>
+          <p:cNvSpPr>
+            <a:spLocks noGrp="1"/>
+          </p:cNvSpPr>
+          <p:nvPr>
+            <p:ph type="title"/>
+          </p:nvPr>
+        </p:nvSpPr>
+        <p:spPr/>
+        <p:txBody>
+          <a:bodyPr/>
+          <a:lstStyle/>
+          <a:p>
+            <a:endParaRPr lang="en-US"/>
+          </a:p>
+        </p:txBody>
+      </p:sp>
+    </p:spTree>
+    <p:extLst>
+      <p:ext uri="{BB962C8B-B14F-4D97-AF65-F5344CB8AC3E}">
+        <p14:creationId xmlns:p14="http://schemas.microsoft.com/office/powerpoint/2010/main" val="2829639721"/>
+      </p:ext>
+    </p:extLst>
+  </p:cSld>
+  <p:clrMapOvr>
+    <a:masterClrMapping/>
+  </p:clrMapOvr>
+</p:sld>
+</file>
+
+<file path=ppt/slides/slide4.xml><?xml version="1.0" encoding="utf-8"?>
+<p:sld xmlns:a="http://schemas.openxmlformats.org/drawingml/2006/main" xmlns:r="http://schemas.openxmlformats.org/officeDocument/2006/relationships" xmlns:p="http://schemas.openxmlformats.org/presentationml/2006/main">
+  <p:cSld>
+    <p:spTree>
+      <p:nvGrpSpPr>
+        <p:cNvPr id="1" name=""/>
+        <p:cNvGrpSpPr/>
+        <p:nvPr/>
+      </p:nvGrpSpPr>
+      <p:grpSpPr>
+        <a:xfrm>
+          <a:off x="0" y="0"/>
+          <a:ext cx="0" cy="0"/>
+          <a:chOff x="0" y="0"/>
+          <a:chExt cx="0" cy="0"/>
+        </a:xfrm>
+      </p:grpSpPr>
+      <p:sp>
+        <p:nvSpPr>
+          <p:cNvPr id="2" name="Title 1">
+            <a:extLst>
+              <a:ext uri="{FF2B5EF4-FFF2-40B4-BE49-F238E27FC236}">
+                <a16:creationId xmlns:a16="http://schemas.microsoft.com/office/drawing/2014/main" id="{9499EFF8-D9AC-F84D-8949-EF6A66C51733}"/>
+              </a:ext>
+            </a:extLst>
+          </p:cNvPr>
+          <p:cNvSpPr>
+            <a:spLocks noGrp="1"/>
+          </p:cNvSpPr>
+          <p:nvPr>
+            <p:ph type="title"/>
+          </p:nvPr>
+        </p:nvSpPr>
+        <p:spPr/>
+        <p:txBody>
+          <a:bodyPr/>
+          <a:lstStyle/>
+          <a:p>
+            <a:r>
+              <a:rPr lang="en-US" dirty="0"/>
+              <a:t>Day 2 of 2 Agenda</a:t>
+            </a:r>
+          </a:p>
+        </p:txBody>
+      </p:sp>
+      <p:sp>
+        <p:nvSpPr>
+          <p:cNvPr id="3" name="Content Placeholder 2">
+            <a:extLst>
+              <a:ext uri="{FF2B5EF4-FFF2-40B4-BE49-F238E27FC236}">
+                <a16:creationId xmlns:a16="http://schemas.microsoft.com/office/drawing/2014/main" id="{510B1FA3-9927-F74A-8D15-783CB3AE14C0}"/>
+              </a:ext>
+            </a:extLst>
+          </p:cNvPr>
+          <p:cNvSpPr>
+            <a:spLocks noGrp="1"/>
+          </p:cNvSpPr>
+          <p:nvPr>
+            <p:ph idx="1"/>
+          </p:nvPr>
+        </p:nvSpPr>
+        <p:spPr/>
+        <p:txBody>
+          <a:bodyPr/>
+          <a:lstStyle/>
+          <a:p>
+            <a:r>
+              <a:rPr lang="en-US" dirty="0"/>
+              <a:t>Content catch-up</a:t>
+            </a:r>
+          </a:p>
+          <a:p>
+            <a:r>
+              <a:rPr lang="en-GB" dirty="0"/>
+              <a:t>Integrate an Azure Cosmos DB solution (5–10%)</a:t>
+            </a:r>
+            <a:endParaRPr lang="en-US" dirty="0"/>
+          </a:p>
+          <a:p>
+            <a:r>
+              <a:rPr lang="en-US" dirty="0"/>
+              <a:t>Optimize an Azure Cosmos DB solution (15–20%)</a:t>
+            </a:r>
+          </a:p>
+          <a:p>
+            <a:r>
+              <a:rPr lang="en-US" dirty="0"/>
+              <a:t>Maintain an Azure Cosmos DB solution (25–30%)</a:t>
+            </a:r>
+          </a:p>
+        </p:txBody>
+      </p:sp>
+    </p:spTree>
+    <p:extLst>
+      <p:ext uri="{BB962C8B-B14F-4D97-AF65-F5344CB8AC3E}">
+        <p14:creationId xmlns:p14="http://schemas.microsoft.com/office/powerpoint/2010/main" val="146140643"/>
       </p:ext>
     </p:extLst>
   </p:cSld>
@@ -6731,7 +7697,7 @@
                                         <p:tgtEl>
                                           <p:spTgt spid="3">
                                             <p:txEl>
-                                              <p:pRg st="1" end="1"/>
+                                              <p:pRg st="2" end="2"/>
                                             </p:txEl>
                                           </p:spTgt>
                                         </p:tgtEl>
@@ -6780,7 +7746,7 @@
                                         <p:tgtEl>
                                           <p:spTgt spid="3">
                                             <p:txEl>
-                                              <p:pRg st="2" end="2"/>
+                                              <p:pRg st="1" end="1"/>
                                             </p:txEl>
                                           </p:spTgt>
                                         </p:tgtEl>
@@ -6826,7 +7792,7 @@
 </p:sld>
 </file>
 
-<file path=ppt/slides/slide30.xml><?xml version="1.0" encoding="utf-8"?>
+<file path=ppt/slides/slide40.xml><?xml version="1.0" encoding="utf-8"?>
 <p:sld xmlns:a="http://schemas.openxmlformats.org/drawingml/2006/main" xmlns:r="http://schemas.openxmlformats.org/officeDocument/2006/relationships" xmlns:p="http://schemas.openxmlformats.org/presentationml/2006/main">
   <p:cSld>
     <p:spTree>
@@ -6871,171 +7837,6 @@
     </p:spTree>
     <p:extLst>
       <p:ext uri="{BB962C8B-B14F-4D97-AF65-F5344CB8AC3E}">
-        <p14:creationId xmlns:p14="http://schemas.microsoft.com/office/powerpoint/2010/main" val="2435013405"/>
-      </p:ext>
-    </p:extLst>
-  </p:cSld>
-  <p:clrMapOvr>
-    <a:masterClrMapping/>
-  </p:clrMapOvr>
-</p:sld>
-</file>
-
-<file path=ppt/slides/slide31.xml><?xml version="1.0" encoding="utf-8"?>
-<p:sld xmlns:a="http://schemas.openxmlformats.org/drawingml/2006/main" xmlns:r="http://schemas.openxmlformats.org/officeDocument/2006/relationships" xmlns:p="http://schemas.openxmlformats.org/presentationml/2006/main">
-  <p:cSld>
-    <p:spTree>
-      <p:nvGrpSpPr>
-        <p:cNvPr id="1" name=""/>
-        <p:cNvGrpSpPr/>
-        <p:nvPr/>
-      </p:nvGrpSpPr>
-      <p:grpSpPr>
-        <a:xfrm>
-          <a:off x="0" y="0"/>
-          <a:ext cx="0" cy="0"/>
-          <a:chOff x="0" y="0"/>
-          <a:chExt cx="0" cy="0"/>
-        </a:xfrm>
-      </p:grpSpPr>
-      <p:sp>
-        <p:nvSpPr>
-          <p:cNvPr id="4" name="Title 3">
-            <a:extLst>
-              <a:ext uri="{FF2B5EF4-FFF2-40B4-BE49-F238E27FC236}">
-                <a16:creationId xmlns:a16="http://schemas.microsoft.com/office/drawing/2014/main" id="{59384D36-FDB2-E34A-B67D-980B0EBB81E7}"/>
-              </a:ext>
-            </a:extLst>
-          </p:cNvPr>
-          <p:cNvSpPr>
-            <a:spLocks noGrp="1"/>
-          </p:cNvSpPr>
-          <p:nvPr>
-            <p:ph type="title"/>
-          </p:nvPr>
-        </p:nvSpPr>
-        <p:spPr/>
-        <p:txBody>
-          <a:bodyPr/>
-          <a:lstStyle/>
-          <a:p>
-            <a:endParaRPr lang="en-US"/>
-          </a:p>
-        </p:txBody>
-      </p:sp>
-    </p:spTree>
-    <p:extLst>
-      <p:ext uri="{BB962C8B-B14F-4D97-AF65-F5344CB8AC3E}">
-        <p14:creationId xmlns:p14="http://schemas.microsoft.com/office/powerpoint/2010/main" val="2641826243"/>
-      </p:ext>
-    </p:extLst>
-  </p:cSld>
-  <p:clrMapOvr>
-    <a:masterClrMapping/>
-  </p:clrMapOvr>
-</p:sld>
-</file>
-
-<file path=ppt/slides/slide32.xml><?xml version="1.0" encoding="utf-8"?>
-<p:sld xmlns:a="http://schemas.openxmlformats.org/drawingml/2006/main" xmlns:r="http://schemas.openxmlformats.org/officeDocument/2006/relationships" xmlns:p="http://schemas.openxmlformats.org/presentationml/2006/main">
-  <p:cSld>
-    <p:spTree>
-      <p:nvGrpSpPr>
-        <p:cNvPr id="1" name=""/>
-        <p:cNvGrpSpPr/>
-        <p:nvPr/>
-      </p:nvGrpSpPr>
-      <p:grpSpPr>
-        <a:xfrm>
-          <a:off x="0" y="0"/>
-          <a:ext cx="0" cy="0"/>
-          <a:chOff x="0" y="0"/>
-          <a:chExt cx="0" cy="0"/>
-        </a:xfrm>
-      </p:grpSpPr>
-      <p:sp>
-        <p:nvSpPr>
-          <p:cNvPr id="4" name="Title 3">
-            <a:extLst>
-              <a:ext uri="{FF2B5EF4-FFF2-40B4-BE49-F238E27FC236}">
-                <a16:creationId xmlns:a16="http://schemas.microsoft.com/office/drawing/2014/main" id="{59384D36-FDB2-E34A-B67D-980B0EBB81E7}"/>
-              </a:ext>
-            </a:extLst>
-          </p:cNvPr>
-          <p:cNvSpPr>
-            <a:spLocks noGrp="1"/>
-          </p:cNvSpPr>
-          <p:nvPr>
-            <p:ph type="title"/>
-          </p:nvPr>
-        </p:nvSpPr>
-        <p:spPr/>
-        <p:txBody>
-          <a:bodyPr/>
-          <a:lstStyle/>
-          <a:p>
-            <a:endParaRPr lang="en-US"/>
-          </a:p>
-        </p:txBody>
-      </p:sp>
-    </p:spTree>
-    <p:extLst>
-      <p:ext uri="{BB962C8B-B14F-4D97-AF65-F5344CB8AC3E}">
-        <p14:creationId xmlns:p14="http://schemas.microsoft.com/office/powerpoint/2010/main" val="2829639721"/>
-      </p:ext>
-    </p:extLst>
-  </p:cSld>
-  <p:clrMapOvr>
-    <a:masterClrMapping/>
-  </p:clrMapOvr>
-</p:sld>
-</file>
-
-<file path=ppt/slides/slide33.xml><?xml version="1.0" encoding="utf-8"?>
-<p:sld xmlns:a="http://schemas.openxmlformats.org/drawingml/2006/main" xmlns:r="http://schemas.openxmlformats.org/officeDocument/2006/relationships" xmlns:p="http://schemas.openxmlformats.org/presentationml/2006/main">
-  <p:cSld>
-    <p:spTree>
-      <p:nvGrpSpPr>
-        <p:cNvPr id="1" name=""/>
-        <p:cNvGrpSpPr/>
-        <p:nvPr/>
-      </p:nvGrpSpPr>
-      <p:grpSpPr>
-        <a:xfrm>
-          <a:off x="0" y="0"/>
-          <a:ext cx="0" cy="0"/>
-          <a:chOff x="0" y="0"/>
-          <a:chExt cx="0" cy="0"/>
-        </a:xfrm>
-      </p:grpSpPr>
-      <p:sp>
-        <p:nvSpPr>
-          <p:cNvPr id="4" name="Title 3">
-            <a:extLst>
-              <a:ext uri="{FF2B5EF4-FFF2-40B4-BE49-F238E27FC236}">
-                <a16:creationId xmlns:a16="http://schemas.microsoft.com/office/drawing/2014/main" id="{59384D36-FDB2-E34A-B67D-980B0EBB81E7}"/>
-              </a:ext>
-            </a:extLst>
-          </p:cNvPr>
-          <p:cNvSpPr>
-            <a:spLocks noGrp="1"/>
-          </p:cNvSpPr>
-          <p:nvPr>
-            <p:ph type="title"/>
-          </p:nvPr>
-        </p:nvSpPr>
-        <p:spPr/>
-        <p:txBody>
-          <a:bodyPr/>
-          <a:lstStyle/>
-          <a:p>
-            <a:endParaRPr lang="en-US"/>
-          </a:p>
-        </p:txBody>
-      </p:sp>
-    </p:spTree>
-    <p:extLst>
-      <p:ext uri="{BB962C8B-B14F-4D97-AF65-F5344CB8AC3E}">
         <p14:creationId xmlns:p14="http://schemas.microsoft.com/office/powerpoint/2010/main" val="3377009993"/>
       </p:ext>
     </p:extLst>
@@ -7043,336 +7844,6 @@
   <p:clrMapOvr>
     <a:masterClrMapping/>
   </p:clrMapOvr>
-</p:sld>
-</file>
-
-<file path=ppt/slides/slide4.xml><?xml version="1.0" encoding="utf-8"?>
-<p:sld xmlns:a="http://schemas.openxmlformats.org/drawingml/2006/main" xmlns:r="http://schemas.openxmlformats.org/officeDocument/2006/relationships" xmlns:p="http://schemas.openxmlformats.org/presentationml/2006/main">
-  <p:cSld>
-    <p:spTree>
-      <p:nvGrpSpPr>
-        <p:cNvPr id="1" name=""/>
-        <p:cNvGrpSpPr/>
-        <p:nvPr/>
-      </p:nvGrpSpPr>
-      <p:grpSpPr>
-        <a:xfrm>
-          <a:off x="0" y="0"/>
-          <a:ext cx="0" cy="0"/>
-          <a:chOff x="0" y="0"/>
-          <a:chExt cx="0" cy="0"/>
-        </a:xfrm>
-      </p:grpSpPr>
-      <p:sp>
-        <p:nvSpPr>
-          <p:cNvPr id="2" name="Title 1">
-            <a:extLst>
-              <a:ext uri="{FF2B5EF4-FFF2-40B4-BE49-F238E27FC236}">
-                <a16:creationId xmlns:a16="http://schemas.microsoft.com/office/drawing/2014/main" id="{9499EFF8-D9AC-F84D-8949-EF6A66C51733}"/>
-              </a:ext>
-            </a:extLst>
-          </p:cNvPr>
-          <p:cNvSpPr>
-            <a:spLocks noGrp="1"/>
-          </p:cNvSpPr>
-          <p:nvPr>
-            <p:ph type="title"/>
-          </p:nvPr>
-        </p:nvSpPr>
-        <p:spPr/>
-        <p:txBody>
-          <a:bodyPr/>
-          <a:lstStyle/>
-          <a:p>
-            <a:r>
-              <a:rPr lang="en-US" dirty="0"/>
-              <a:t>Day 2 of 2 Agenda</a:t>
-            </a:r>
-          </a:p>
-        </p:txBody>
-      </p:sp>
-      <p:sp>
-        <p:nvSpPr>
-          <p:cNvPr id="3" name="Content Placeholder 2">
-            <a:extLst>
-              <a:ext uri="{FF2B5EF4-FFF2-40B4-BE49-F238E27FC236}">
-                <a16:creationId xmlns:a16="http://schemas.microsoft.com/office/drawing/2014/main" id="{510B1FA3-9927-F74A-8D15-783CB3AE14C0}"/>
-              </a:ext>
-            </a:extLst>
-          </p:cNvPr>
-          <p:cNvSpPr>
-            <a:spLocks noGrp="1"/>
-          </p:cNvSpPr>
-          <p:nvPr>
-            <p:ph idx="1"/>
-          </p:nvPr>
-        </p:nvSpPr>
-        <p:spPr/>
-        <p:txBody>
-          <a:bodyPr/>
-          <a:lstStyle/>
-          <a:p>
-            <a:r>
-              <a:rPr lang="en-US" dirty="0"/>
-              <a:t>Content catch-up</a:t>
-            </a:r>
-          </a:p>
-          <a:p>
-            <a:r>
-              <a:rPr lang="en-US" dirty="0"/>
-              <a:t>Optimize an Azure Cosmos DB solution (15–20%)</a:t>
-            </a:r>
-          </a:p>
-          <a:p>
-            <a:r>
-              <a:rPr lang="en-US" dirty="0"/>
-              <a:t>Maintain an Azure Cosmos DB solution (25–30%)</a:t>
-            </a:r>
-          </a:p>
-          <a:p>
-            <a:r>
-              <a:rPr lang="en-US" dirty="0"/>
-              <a:t>Exam DP-203 strategy</a:t>
-            </a:r>
-          </a:p>
-        </p:txBody>
-      </p:sp>
-    </p:spTree>
-    <p:extLst>
-      <p:ext uri="{BB962C8B-B14F-4D97-AF65-F5344CB8AC3E}">
-        <p14:creationId xmlns:p14="http://schemas.microsoft.com/office/powerpoint/2010/main" val="146140643"/>
-      </p:ext>
-    </p:extLst>
-  </p:cSld>
-  <p:clrMapOvr>
-    <a:masterClrMapping/>
-  </p:clrMapOvr>
-  <p:timing>
-    <p:tnLst>
-      <p:par>
-        <p:cTn id="1" dur="indefinite" restart="never" nodeType="tmRoot">
-          <p:childTnLst>
-            <p:seq concurrent="1" nextAc="seek">
-              <p:cTn id="2" dur="indefinite" nodeType="mainSeq">
-                <p:childTnLst>
-                  <p:par>
-                    <p:cTn id="3" fill="hold">
-                      <p:stCondLst>
-                        <p:cond delay="indefinite"/>
-                      </p:stCondLst>
-                      <p:childTnLst>
-                        <p:par>
-                          <p:cTn id="4" fill="hold">
-                            <p:stCondLst>
-                              <p:cond delay="0"/>
-                            </p:stCondLst>
-                            <p:childTnLst>
-                              <p:par>
-                                <p:cTn id="5" presetID="1" presetClass="entr" presetSubtype="0" fill="hold" nodeType="clickEffect">
-                                  <p:stCondLst>
-                                    <p:cond delay="0"/>
-                                  </p:stCondLst>
-                                  <p:childTnLst>
-                                    <p:set>
-                                      <p:cBhvr>
-                                        <p:cTn id="6" dur="1" fill="hold">
-                                          <p:stCondLst>
-                                            <p:cond delay="0"/>
-                                          </p:stCondLst>
-                                        </p:cTn>
-                                        <p:tgtEl>
-                                          <p:spTgt spid="3">
-                                            <p:txEl>
-                                              <p:pRg st="0" end="0"/>
-                                            </p:txEl>
-                                          </p:spTgt>
-                                        </p:tgtEl>
-                                        <p:attrNameLst>
-                                          <p:attrName>style.visibility</p:attrName>
-                                        </p:attrNameLst>
-                                      </p:cBhvr>
-                                      <p:to>
-                                        <p:strVal val="visible"/>
-                                      </p:to>
-                                    </p:set>
-                                  </p:childTnLst>
-                                </p:cTn>
-                              </p:par>
-                            </p:childTnLst>
-                          </p:cTn>
-                        </p:par>
-                      </p:childTnLst>
-                    </p:cTn>
-                  </p:par>
-                  <p:par>
-                    <p:cTn id="7" fill="hold">
-                      <p:stCondLst>
-                        <p:cond delay="indefinite"/>
-                      </p:stCondLst>
-                      <p:childTnLst>
-                        <p:par>
-                          <p:cTn id="8" fill="hold">
-                            <p:stCondLst>
-                              <p:cond delay="0"/>
-                            </p:stCondLst>
-                            <p:childTnLst>
-                              <p:par>
-                                <p:cTn id="9" presetID="1" presetClass="entr" presetSubtype="0" fill="hold" nodeType="clickEffect">
-                                  <p:stCondLst>
-                                    <p:cond delay="0"/>
-                                  </p:stCondLst>
-                                  <p:childTnLst>
-                                    <p:set>
-                                      <p:cBhvr>
-                                        <p:cTn id="10" dur="1" fill="hold">
-                                          <p:stCondLst>
-                                            <p:cond delay="0"/>
-                                          </p:stCondLst>
-                                        </p:cTn>
-                                        <p:tgtEl>
-                                          <p:spTgt spid="3">
-                                            <p:txEl>
-                                              <p:pRg st="2" end="2"/>
-                                            </p:txEl>
-                                          </p:spTgt>
-                                        </p:tgtEl>
-                                        <p:attrNameLst>
-                                          <p:attrName>style.visibility</p:attrName>
-                                        </p:attrNameLst>
-                                      </p:cBhvr>
-                                      <p:to>
-                                        <p:strVal val="visible"/>
-                                      </p:to>
-                                    </p:set>
-                                  </p:childTnLst>
-                                </p:cTn>
-                              </p:par>
-                            </p:childTnLst>
-                          </p:cTn>
-                        </p:par>
-                      </p:childTnLst>
-                    </p:cTn>
-                  </p:par>
-                  <p:par>
-                    <p:cTn id="11" fill="hold">
-                      <p:stCondLst>
-                        <p:cond delay="indefinite"/>
-                      </p:stCondLst>
-                      <p:childTnLst>
-                        <p:par>
-                          <p:cTn id="12" fill="hold">
-                            <p:stCondLst>
-                              <p:cond delay="0"/>
-                            </p:stCondLst>
-                            <p:childTnLst>
-                              <p:par>
-                                <p:cTn id="13" presetID="1" presetClass="entr" presetSubtype="0" fill="hold" nodeType="clickEffect">
-                                  <p:stCondLst>
-                                    <p:cond delay="0"/>
-                                  </p:stCondLst>
-                                  <p:childTnLst>
-                                    <p:set>
-                                      <p:cBhvr>
-                                        <p:cTn id="14" dur="1" fill="hold">
-                                          <p:stCondLst>
-                                            <p:cond delay="0"/>
-                                          </p:stCondLst>
-                                        </p:cTn>
-                                        <p:tgtEl>
-                                          <p:spTgt spid="3">
-                                            <p:txEl>
-                                              <p:pRg st="1" end="1"/>
-                                            </p:txEl>
-                                          </p:spTgt>
-                                        </p:tgtEl>
-                                        <p:attrNameLst>
-                                          <p:attrName>style.visibility</p:attrName>
-                                        </p:attrNameLst>
-                                      </p:cBhvr>
-                                      <p:to>
-                                        <p:strVal val="visible"/>
-                                      </p:to>
-                                    </p:set>
-                                  </p:childTnLst>
-                                </p:cTn>
-                              </p:par>
-                            </p:childTnLst>
-                          </p:cTn>
-                        </p:par>
-                      </p:childTnLst>
-                    </p:cTn>
-                  </p:par>
-                  <p:par>
-                    <p:cTn id="15" fill="hold">
-                      <p:stCondLst>
-                        <p:cond delay="indefinite"/>
-                      </p:stCondLst>
-                      <p:childTnLst>
-                        <p:par>
-                          <p:cTn id="16" fill="hold">
-                            <p:stCondLst>
-                              <p:cond delay="0"/>
-                            </p:stCondLst>
-                            <p:childTnLst>
-                              <p:par>
-                                <p:cTn id="17" presetID="1" presetClass="entr" presetSubtype="0" fill="hold" nodeType="clickEffect">
-                                  <p:stCondLst>
-                                    <p:cond delay="0"/>
-                                  </p:stCondLst>
-                                  <p:childTnLst>
-                                    <p:set>
-                                      <p:cBhvr>
-                                        <p:cTn id="18" dur="1" fill="hold">
-                                          <p:stCondLst>
-                                            <p:cond delay="0"/>
-                                          </p:stCondLst>
-                                        </p:cTn>
-                                        <p:tgtEl>
-                                          <p:spTgt spid="3">
-                                            <p:txEl>
-                                              <p:pRg st="3" end="3"/>
-                                            </p:txEl>
-                                          </p:spTgt>
-                                        </p:tgtEl>
-                                        <p:attrNameLst>
-                                          <p:attrName>style.visibility</p:attrName>
-                                        </p:attrNameLst>
-                                      </p:cBhvr>
-                                      <p:to>
-                                        <p:strVal val="visible"/>
-                                      </p:to>
-                                    </p:set>
-                                  </p:childTnLst>
-                                </p:cTn>
-                              </p:par>
-                            </p:childTnLst>
-                          </p:cTn>
-                        </p:par>
-                      </p:childTnLst>
-                    </p:cTn>
-                  </p:par>
-                </p:childTnLst>
-              </p:cTn>
-              <p:prevCondLst>
-                <p:cond evt="onPrev" delay="0">
-                  <p:tgtEl>
-                    <p:sldTgt/>
-                  </p:tgtEl>
-                </p:cond>
-              </p:prevCondLst>
-              <p:nextCondLst>
-                <p:cond evt="onNext" delay="0">
-                  <p:tgtEl>
-                    <p:sldTgt/>
-                  </p:tgtEl>
-                </p:cond>
-              </p:nextCondLst>
-            </p:seq>
-          </p:childTnLst>
-        </p:cTn>
-      </p:par>
-    </p:tnLst>
-  </p:timing>
 </p:sld>
 </file>
 

</xml_diff>